<commit_message>
HWA-31 #comment AM: Added presentation, Jira and SonarQube screenshots and updated README.md.
</commit_message>
<xml_diff>
--- a/Documentation/HWA Project.pptx
+++ b/Documentation/HWA Project.pptx
@@ -10,11 +10,12 @@
     <p:sldId id="258" r:id="rId4"/>
     <p:sldId id="266" r:id="rId5"/>
     <p:sldId id="259" r:id="rId6"/>
-    <p:sldId id="260" r:id="rId7"/>
-    <p:sldId id="261" r:id="rId8"/>
-    <p:sldId id="262" r:id="rId9"/>
-    <p:sldId id="263" r:id="rId10"/>
-    <p:sldId id="264" r:id="rId11"/>
+    <p:sldId id="267" r:id="rId7"/>
+    <p:sldId id="260" r:id="rId8"/>
+    <p:sldId id="261" r:id="rId9"/>
+    <p:sldId id="262" r:id="rId10"/>
+    <p:sldId id="263" r:id="rId11"/>
+    <p:sldId id="264" r:id="rId12"/>
   </p:sldIdLst>
   <p:sldSz cx="12192000" cy="6858000"/>
   <p:notesSz cx="6858000" cy="9144000"/>
@@ -307,7 +308,7 @@
           <a:p>
             <a:fld id="{1DAE319A-9023-44E9-8348-8BBF1A41BE81}" type="datetimeFigureOut">
               <a:rPr lang="en-GB" smtClean="0"/>
-              <a:t>18/06/2021</a:t>
+              <a:t>20/06/2021</a:t>
             </a:fld>
             <a:endParaRPr lang="en-GB"/>
           </a:p>
@@ -582,7 +583,7 @@
           <a:p>
             <a:fld id="{1DAE319A-9023-44E9-8348-8BBF1A41BE81}" type="datetimeFigureOut">
               <a:rPr lang="en-GB" smtClean="0"/>
-              <a:t>18/06/2021</a:t>
+              <a:t>20/06/2021</a:t>
             </a:fld>
             <a:endParaRPr lang="en-GB"/>
           </a:p>
@@ -776,7 +777,7 @@
           <a:p>
             <a:fld id="{1DAE319A-9023-44E9-8348-8BBF1A41BE81}" type="datetimeFigureOut">
               <a:rPr lang="en-GB" smtClean="0"/>
-              <a:t>18/06/2021</a:t>
+              <a:t>20/06/2021</a:t>
             </a:fld>
             <a:endParaRPr lang="en-GB"/>
           </a:p>
@@ -1047,7 +1048,7 @@
           <a:p>
             <a:fld id="{1DAE319A-9023-44E9-8348-8BBF1A41BE81}" type="datetimeFigureOut">
               <a:rPr lang="en-GB" smtClean="0"/>
-              <a:t>18/06/2021</a:t>
+              <a:t>20/06/2021</a:t>
             </a:fld>
             <a:endParaRPr lang="en-GB"/>
           </a:p>
@@ -1374,7 +1375,7 @@
           <a:p>
             <a:fld id="{1DAE319A-9023-44E9-8348-8BBF1A41BE81}" type="datetimeFigureOut">
               <a:rPr lang="en-GB" smtClean="0"/>
-              <a:t>18/06/2021</a:t>
+              <a:t>20/06/2021</a:t>
             </a:fld>
             <a:endParaRPr lang="en-GB"/>
           </a:p>
@@ -1993,7 +1994,7 @@
           <a:p>
             <a:fld id="{1DAE319A-9023-44E9-8348-8BBF1A41BE81}" type="datetimeFigureOut">
               <a:rPr lang="en-GB" smtClean="0"/>
-              <a:t>18/06/2021</a:t>
+              <a:t>20/06/2021</a:t>
             </a:fld>
             <a:endParaRPr lang="en-GB"/>
           </a:p>
@@ -2840,7 +2841,7 @@
           <a:p>
             <a:fld id="{1DAE319A-9023-44E9-8348-8BBF1A41BE81}" type="datetimeFigureOut">
               <a:rPr lang="en-GB" smtClean="0"/>
-              <a:t>18/06/2021</a:t>
+              <a:t>20/06/2021</a:t>
             </a:fld>
             <a:endParaRPr lang="en-GB"/>
           </a:p>
@@ -3010,7 +3011,7 @@
           <a:p>
             <a:fld id="{1DAE319A-9023-44E9-8348-8BBF1A41BE81}" type="datetimeFigureOut">
               <a:rPr lang="en-GB" smtClean="0"/>
-              <a:t>18/06/2021</a:t>
+              <a:t>20/06/2021</a:t>
             </a:fld>
             <a:endParaRPr lang="en-GB"/>
           </a:p>
@@ -3190,7 +3191,7 @@
           <a:p>
             <a:fld id="{1DAE319A-9023-44E9-8348-8BBF1A41BE81}" type="datetimeFigureOut">
               <a:rPr lang="en-GB" smtClean="0"/>
-              <a:t>18/06/2021</a:t>
+              <a:t>20/06/2021</a:t>
             </a:fld>
             <a:endParaRPr lang="en-GB"/>
           </a:p>
@@ -3360,7 +3361,7 @@
           <a:p>
             <a:fld id="{1DAE319A-9023-44E9-8348-8BBF1A41BE81}" type="datetimeFigureOut">
               <a:rPr lang="en-GB" smtClean="0"/>
-              <a:t>18/06/2021</a:t>
+              <a:t>20/06/2021</a:t>
             </a:fld>
             <a:endParaRPr lang="en-GB"/>
           </a:p>
@@ -3607,7 +3608,7 @@
           <a:p>
             <a:fld id="{1DAE319A-9023-44E9-8348-8BBF1A41BE81}" type="datetimeFigureOut">
               <a:rPr lang="en-GB" smtClean="0"/>
-              <a:t>18/06/2021</a:t>
+              <a:t>20/06/2021</a:t>
             </a:fld>
             <a:endParaRPr lang="en-GB"/>
           </a:p>
@@ -3899,7 +3900,7 @@
           <a:p>
             <a:fld id="{1DAE319A-9023-44E9-8348-8BBF1A41BE81}" type="datetimeFigureOut">
               <a:rPr lang="en-GB" smtClean="0"/>
-              <a:t>18/06/2021</a:t>
+              <a:t>20/06/2021</a:t>
             </a:fld>
             <a:endParaRPr lang="en-GB"/>
           </a:p>
@@ -4343,7 +4344,7 @@
           <a:p>
             <a:fld id="{1DAE319A-9023-44E9-8348-8BBF1A41BE81}" type="datetimeFigureOut">
               <a:rPr lang="en-GB" smtClean="0"/>
-              <a:t>18/06/2021</a:t>
+              <a:t>20/06/2021</a:t>
             </a:fld>
             <a:endParaRPr lang="en-GB"/>
           </a:p>
@@ -4461,7 +4462,7 @@
           <a:p>
             <a:fld id="{1DAE319A-9023-44E9-8348-8BBF1A41BE81}" type="datetimeFigureOut">
               <a:rPr lang="en-GB" smtClean="0"/>
-              <a:t>18/06/2021</a:t>
+              <a:t>20/06/2021</a:t>
             </a:fld>
             <a:endParaRPr lang="en-GB"/>
           </a:p>
@@ -4556,7 +4557,7 @@
           <a:p>
             <a:fld id="{1DAE319A-9023-44E9-8348-8BBF1A41BE81}" type="datetimeFigureOut">
               <a:rPr lang="en-GB" smtClean="0"/>
-              <a:t>18/06/2021</a:t>
+              <a:t>20/06/2021</a:t>
             </a:fld>
             <a:endParaRPr lang="en-GB"/>
           </a:p>
@@ -4835,7 +4836,7 @@
           <a:p>
             <a:fld id="{1DAE319A-9023-44E9-8348-8BBF1A41BE81}" type="datetimeFigureOut">
               <a:rPr lang="en-GB" smtClean="0"/>
-              <a:t>18/06/2021</a:t>
+              <a:t>20/06/2021</a:t>
             </a:fld>
             <a:endParaRPr lang="en-GB"/>
           </a:p>
@@ -5110,7 +5111,7 @@
           <a:p>
             <a:fld id="{1DAE319A-9023-44E9-8348-8BBF1A41BE81}" type="datetimeFigureOut">
               <a:rPr lang="en-GB" smtClean="0"/>
-              <a:t>18/06/2021</a:t>
+              <a:t>20/06/2021</a:t>
             </a:fld>
             <a:endParaRPr lang="en-GB"/>
           </a:p>
@@ -5533,7 +5534,7 @@
           <a:p>
             <a:fld id="{1DAE319A-9023-44E9-8348-8BBF1A41BE81}" type="datetimeFigureOut">
               <a:rPr lang="en-GB" smtClean="0"/>
-              <a:t>18/06/2021</a:t>
+              <a:t>20/06/2021</a:t>
             </a:fld>
             <a:endParaRPr lang="en-GB"/>
           </a:p>
@@ -6166,6 +6167,177 @@
           <p:cNvPr id="2" name="Title 1">
             <a:extLst>
               <a:ext uri="{FF2B5EF4-FFF2-40B4-BE49-F238E27FC236}">
+                <a16:creationId xmlns:a16="http://schemas.microsoft.com/office/drawing/2014/main" id="{8CC9A52B-6B1F-47CF-82B3-7A2C3B2E493B}"/>
+              </a:ext>
+            </a:extLst>
+          </p:cNvPr>
+          <p:cNvSpPr>
+            <a:spLocks noGrp="1"/>
+          </p:cNvSpPr>
+          <p:nvPr>
+            <p:ph type="title"/>
+          </p:nvPr>
+        </p:nvSpPr>
+        <p:spPr/>
+        <p:txBody>
+          <a:bodyPr/>
+          <a:lstStyle/>
+          <a:p>
+            <a:r>
+              <a:rPr lang="en-US" dirty="0">
+                <a:solidFill>
+                  <a:schemeClr val="tx1"/>
+                </a:solidFill>
+              </a:rPr>
+              <a:t>Conclusion</a:t>
+            </a:r>
+            <a:br>
+              <a:rPr lang="en-US" dirty="0">
+                <a:solidFill>
+                  <a:schemeClr val="tx1"/>
+                </a:solidFill>
+              </a:rPr>
+            </a:br>
+            <a:r>
+              <a:rPr lang="en-GB" sz="1800" dirty="0">
+                <a:solidFill>
+                  <a:schemeClr val="tx1"/>
+                </a:solidFill>
+                <a:effectLst/>
+                <a:latin typeface="Montserrat Light"/>
+                <a:ea typeface="Calibri" panose="020F0502020204030204" pitchFamily="34" charset="0"/>
+                <a:cs typeface="Segoe UI" panose="020B0502040204020203" pitchFamily="34" charset="0"/>
+              </a:rPr>
+              <a:t>Reflections on the project, future steps.</a:t>
+            </a:r>
+            <a:endParaRPr lang="en-GB" dirty="0">
+              <a:solidFill>
+                <a:schemeClr val="tx1"/>
+              </a:solidFill>
+            </a:endParaRPr>
+          </a:p>
+        </p:txBody>
+      </p:sp>
+      <p:sp>
+        <p:nvSpPr>
+          <p:cNvPr id="3" name="Content Placeholder 2">
+            <a:extLst>
+              <a:ext uri="{FF2B5EF4-FFF2-40B4-BE49-F238E27FC236}">
+                <a16:creationId xmlns:a16="http://schemas.microsoft.com/office/drawing/2014/main" id="{E7CEB03A-F562-4236-ACA9-CA5C1D26986E}"/>
+              </a:ext>
+            </a:extLst>
+          </p:cNvPr>
+          <p:cNvSpPr>
+            <a:spLocks noGrp="1"/>
+          </p:cNvSpPr>
+          <p:nvPr>
+            <p:ph idx="1"/>
+          </p:nvPr>
+        </p:nvSpPr>
+        <p:spPr/>
+        <p:txBody>
+          <a:bodyPr/>
+          <a:lstStyle/>
+          <a:p>
+            <a:r>
+              <a:rPr lang="en-US" dirty="0"/>
+              <a:t>Project helped me gain confidence in Spring Boot and HTML/CSS/JS</a:t>
+            </a:r>
+          </a:p>
+          <a:p>
+            <a:r>
+              <a:rPr lang="en-US" dirty="0"/>
+              <a:t>Learned usefulness of JS in creating elements.</a:t>
+            </a:r>
+          </a:p>
+          <a:p>
+            <a:r>
+              <a:rPr lang="en-US" dirty="0"/>
+              <a:t>Learned how to do frontend testing with Selenium.</a:t>
+            </a:r>
+          </a:p>
+          <a:p>
+            <a:endParaRPr lang="en-US" dirty="0"/>
+          </a:p>
+          <a:p>
+            <a:r>
+              <a:rPr lang="en-US" dirty="0"/>
+              <a:t>Future work</a:t>
+            </a:r>
+          </a:p>
+          <a:p>
+            <a:pPr lvl="1"/>
+            <a:r>
+              <a:rPr lang="en-US" dirty="0"/>
+              <a:t>Redesign UI, more responsive etc..</a:t>
+            </a:r>
+          </a:p>
+          <a:p>
+            <a:pPr lvl="1"/>
+            <a:r>
+              <a:rPr lang="en-US" dirty="0"/>
+              <a:t>Add option to add service items</a:t>
+            </a:r>
+          </a:p>
+          <a:p>
+            <a:pPr lvl="1"/>
+            <a:r>
+              <a:rPr lang="en-US" dirty="0"/>
+              <a:t>Add options to notify of next MOT, Tax </a:t>
+            </a:r>
+            <a:r>
+              <a:rPr lang="en-US" dirty="0" err="1"/>
+              <a:t>etc</a:t>
+            </a:r>
+            <a:r>
+              <a:rPr lang="en-US" dirty="0"/>
+              <a:t>…</a:t>
+            </a:r>
+          </a:p>
+          <a:p>
+            <a:pPr lvl="1"/>
+            <a:r>
+              <a:rPr lang="en-US" dirty="0"/>
+              <a:t>Automatically enter current details in to fields when selecting car to update.</a:t>
+            </a:r>
+          </a:p>
+        </p:txBody>
+      </p:sp>
+    </p:spTree>
+    <p:extLst>
+      <p:ext uri="{BB962C8B-B14F-4D97-AF65-F5344CB8AC3E}">
+        <p14:creationId xmlns:p14="http://schemas.microsoft.com/office/powerpoint/2010/main" val="3107617867"/>
+      </p:ext>
+    </p:extLst>
+  </p:cSld>
+  <p:clrMapOvr>
+    <a:masterClrMapping/>
+  </p:clrMapOvr>
+</p:sld>
+</file>
+
+<file path=ppt/slides/slide11.xml><?xml version="1.0" encoding="utf-8"?>
+<p:sld xmlns:a="http://schemas.openxmlformats.org/drawingml/2006/main" xmlns:r="http://schemas.openxmlformats.org/officeDocument/2006/relationships" xmlns:p="http://schemas.openxmlformats.org/presentationml/2006/main">
+  <p:cSld>
+    <p:spTree>
+      <p:nvGrpSpPr>
+        <p:cNvPr id="1" name=""/>
+        <p:cNvGrpSpPr/>
+        <p:nvPr/>
+      </p:nvGrpSpPr>
+      <p:grpSpPr>
+        <a:xfrm>
+          <a:off x="0" y="0"/>
+          <a:ext cx="0" cy="0"/>
+          <a:chOff x="0" y="0"/>
+          <a:chExt cx="0" cy="0"/>
+        </a:xfrm>
+      </p:grpSpPr>
+      <p:sp>
+        <p:nvSpPr>
+          <p:cNvPr id="2" name="Title 1">
+            <a:extLst>
+              <a:ext uri="{FF2B5EF4-FFF2-40B4-BE49-F238E27FC236}">
                 <a16:creationId xmlns:a16="http://schemas.microsoft.com/office/drawing/2014/main" id="{40102A06-EC09-40F4-A449-0037174AACDD}"/>
               </a:ext>
             </a:extLst>
@@ -6920,12 +7092,68 @@
                 <a:ea typeface="Calibri" panose="020F0502020204030204" pitchFamily="34" charset="0"/>
                 <a:cs typeface="Segoe UI" panose="020B0502040204020203" pitchFamily="34" charset="0"/>
               </a:rPr>
-              <a:t> folder was 84.9%</a:t>
+              <a:t> folder was </a:t>
+            </a:r>
+            <a:r>
+              <a:rPr lang="en-GB" dirty="0">
+                <a:latin typeface="Montserrat Light"/>
+                <a:ea typeface="Calibri" panose="020F0502020204030204" pitchFamily="34" charset="0"/>
+                <a:cs typeface="Segoe UI" panose="020B0502040204020203" pitchFamily="34" charset="0"/>
+              </a:rPr>
+              <a:t>98.4</a:t>
+            </a:r>
+            <a:r>
+              <a:rPr lang="en-GB" sz="2000" dirty="0">
+                <a:solidFill>
+                  <a:schemeClr val="tx1"/>
+                </a:solidFill>
+                <a:effectLst/>
+                <a:latin typeface="Montserrat Light"/>
+                <a:ea typeface="Calibri" panose="020F0502020204030204" pitchFamily="34" charset="0"/>
+                <a:cs typeface="Segoe UI" panose="020B0502040204020203" pitchFamily="34" charset="0"/>
+              </a:rPr>
+              <a:t>% in eclipse. </a:t>
             </a:r>
             <a:endParaRPr lang="en-US" dirty="0"/>
           </a:p>
         </p:txBody>
       </p:sp>
+      <p:pic>
+        <p:nvPicPr>
+          <p:cNvPr id="7" name="Picture 6">
+            <a:extLst>
+              <a:ext uri="{FF2B5EF4-FFF2-40B4-BE49-F238E27FC236}">
+                <a16:creationId xmlns:a16="http://schemas.microsoft.com/office/drawing/2014/main" id="{CAD7BB5D-ED48-456E-A555-43C047FA93D8}"/>
+              </a:ext>
+            </a:extLst>
+          </p:cNvPr>
+          <p:cNvPicPr>
+            <a:picLocks noChangeAspect="1"/>
+          </p:cNvPicPr>
+          <p:nvPr/>
+        </p:nvPicPr>
+        <p:blipFill>
+          <a:blip r:embed="rId2">
+            <a:extLst>
+              <a:ext uri="{28A0092B-C50C-407E-A947-70E740481C1C}">
+                <a14:useLocalDpi xmlns:a14="http://schemas.microsoft.com/office/drawing/2010/main" val="0"/>
+              </a:ext>
+            </a:extLst>
+          </a:blip>
+          <a:stretch>
+            <a:fillRect/>
+          </a:stretch>
+        </p:blipFill>
+        <p:spPr>
+          <a:xfrm>
+            <a:off x="2561732" y="5219173"/>
+            <a:ext cx="7068536" cy="1228896"/>
+          </a:xfrm>
+          <a:prstGeom prst="rect">
+            <a:avLst/>
+          </a:prstGeom>
+        </p:spPr>
+      </p:pic>
     </p:spTree>
     <p:extLst>
       <p:ext uri="{BB962C8B-B14F-4D97-AF65-F5344CB8AC3E}">
@@ -6961,7 +7189,7 @@
           <p:cNvPr id="2" name="Title 1">
             <a:extLst>
               <a:ext uri="{FF2B5EF4-FFF2-40B4-BE49-F238E27FC236}">
-                <a16:creationId xmlns:a16="http://schemas.microsoft.com/office/drawing/2014/main" id="{C3D4FC5A-55A6-4C3A-BC30-623785C8AD81}"/>
+                <a16:creationId xmlns:a16="http://schemas.microsoft.com/office/drawing/2014/main" id="{FB08C8F3-9FA0-4F3F-B776-13E1B3410AC2}"/>
               </a:ext>
             </a:extLst>
           </p:cNvPr>
@@ -6979,7 +7207,14 @@
           <a:p>
             <a:r>
               <a:rPr lang="en-US" dirty="0"/>
-              <a:t>Demonstration</a:t>
+              <a:t>Testing (SonarQube)</a:t>
+            </a:r>
+            <a:br>
+              <a:rPr lang="en-US" dirty="0"/>
+            </a:br>
+            <a:r>
+              <a:rPr lang="en-US" sz="1800" dirty="0"/>
+              <a:t>Static analysis tool</a:t>
             </a:r>
             <a:endParaRPr lang="en-GB" dirty="0"/>
           </a:p>
@@ -6987,10 +7222,10 @@
       </p:sp>
       <p:sp>
         <p:nvSpPr>
-          <p:cNvPr id="3" name="Content Placeholder 2">
+          <p:cNvPr id="11" name="Content Placeholder 10">
             <a:extLst>
               <a:ext uri="{FF2B5EF4-FFF2-40B4-BE49-F238E27FC236}">
-                <a16:creationId xmlns:a16="http://schemas.microsoft.com/office/drawing/2014/main" id="{3200C5F3-97C1-4F08-839B-FF2A0DB95FE0}"/>
+                <a16:creationId xmlns:a16="http://schemas.microsoft.com/office/drawing/2014/main" id="{57398C2E-FD12-4E90-B753-58FBCC845351}"/>
               </a:ext>
             </a:extLst>
           </p:cNvPr>
@@ -7008,34 +7243,63 @@
           <a:p>
             <a:r>
               <a:rPr lang="en-US" dirty="0"/>
-              <a:t>AS A USER, I want to be able to add a car to the system. SO I CAN start recording the modifications.</a:t>
+              <a:t>Helped refactoring code (duplicated code).</a:t>
             </a:r>
           </a:p>
           <a:p>
             <a:r>
               <a:rPr lang="en-US" dirty="0"/>
-              <a:t>AS A USER, I want to be able to add a modification to a car. SO I CAN keep track of the modification.</a:t>
+              <a:t>Efficient coding.</a:t>
             </a:r>
           </a:p>
           <a:p>
             <a:r>
               <a:rPr lang="en-US" dirty="0"/>
-              <a:t>AS A USER, I want to be able to read all modifications on a car. SO I CAN see all the modifications on the car.</a:t>
-            </a:r>
-          </a:p>
-          <a:p>
-            <a:r>
-              <a:rPr lang="en-US" dirty="0"/>
-              <a:t>AS A USER, I want to see how much I've spent on modifications.</a:t>
-            </a:r>
-            <a:endParaRPr lang="en-GB" dirty="0"/>
-          </a:p>
-        </p:txBody>
-      </p:sp>
+              <a:t>Coverage was different 98.9%</a:t>
+            </a:r>
+          </a:p>
+        </p:txBody>
+      </p:sp>
+      <p:pic>
+        <p:nvPicPr>
+          <p:cNvPr id="13" name="Picture 12">
+            <a:extLst>
+              <a:ext uri="{FF2B5EF4-FFF2-40B4-BE49-F238E27FC236}">
+                <a16:creationId xmlns:a16="http://schemas.microsoft.com/office/drawing/2014/main" id="{9814C839-0C48-4DD7-932E-66B912ED1A93}"/>
+              </a:ext>
+            </a:extLst>
+          </p:cNvPr>
+          <p:cNvPicPr>
+            <a:picLocks noChangeAspect="1"/>
+          </p:cNvPicPr>
+          <p:nvPr/>
+        </p:nvPicPr>
+        <p:blipFill>
+          <a:blip r:embed="rId2">
+            <a:extLst>
+              <a:ext uri="{28A0092B-C50C-407E-A947-70E740481C1C}">
+                <a14:useLocalDpi xmlns:a14="http://schemas.microsoft.com/office/drawing/2010/main" val="0"/>
+              </a:ext>
+            </a:extLst>
+          </a:blip>
+          <a:stretch>
+            <a:fillRect/>
+          </a:stretch>
+        </p:blipFill>
+        <p:spPr>
+          <a:xfrm>
+            <a:off x="1103312" y="3429000"/>
+            <a:ext cx="9335803" cy="1400370"/>
+          </a:xfrm>
+          <a:prstGeom prst="rect">
+            <a:avLst/>
+          </a:prstGeom>
+        </p:spPr>
+      </p:pic>
     </p:spTree>
     <p:extLst>
       <p:ext uri="{BB962C8B-B14F-4D97-AF65-F5344CB8AC3E}">
-        <p14:creationId xmlns:p14="http://schemas.microsoft.com/office/powerpoint/2010/main" val="2340439451"/>
+        <p14:creationId xmlns:p14="http://schemas.microsoft.com/office/powerpoint/2010/main" val="2896902512"/>
       </p:ext>
     </p:extLst>
   </p:cSld>
@@ -7067,7 +7331,7 @@
           <p:cNvPr id="2" name="Title 1">
             <a:extLst>
               <a:ext uri="{FF2B5EF4-FFF2-40B4-BE49-F238E27FC236}">
-                <a16:creationId xmlns:a16="http://schemas.microsoft.com/office/drawing/2014/main" id="{83026605-4CDC-49E7-8D2D-5A2B709B4BBC}"/>
+                <a16:creationId xmlns:a16="http://schemas.microsoft.com/office/drawing/2014/main" id="{C3D4FC5A-55A6-4C3A-BC30-623785C8AD81}"/>
               </a:ext>
             </a:extLst>
           </p:cNvPr>
@@ -7085,28 +7349,9 @@
           <a:p>
             <a:r>
               <a:rPr lang="en-US" dirty="0"/>
-              <a:t>Sprint Review</a:t>
-            </a:r>
-            <a:br>
-              <a:rPr lang="en-US" dirty="0"/>
-            </a:br>
-            <a:r>
-              <a:rPr lang="en-GB" sz="1800" dirty="0">
-                <a:solidFill>
-                  <a:schemeClr val="tx1"/>
-                </a:solidFill>
-                <a:effectLst/>
-                <a:latin typeface="Montserrat Light"/>
-                <a:ea typeface="Calibri" panose="020F0502020204030204" pitchFamily="34" charset="0"/>
-                <a:cs typeface="Segoe UI" panose="020B0502040204020203" pitchFamily="34" charset="0"/>
-              </a:rPr>
-              <a:t>What did I complete? What got left behind?</a:t>
-            </a:r>
-            <a:endParaRPr lang="en-GB" dirty="0">
-              <a:solidFill>
-                <a:schemeClr val="tx1"/>
-              </a:solidFill>
-            </a:endParaRPr>
+              <a:t>Demonstration</a:t>
+            </a:r>
+            <a:endParaRPr lang="en-GB" dirty="0"/>
           </a:p>
         </p:txBody>
       </p:sp>
@@ -7115,7 +7360,7 @@
           <p:cNvPr id="3" name="Content Placeholder 2">
             <a:extLst>
               <a:ext uri="{FF2B5EF4-FFF2-40B4-BE49-F238E27FC236}">
-                <a16:creationId xmlns:a16="http://schemas.microsoft.com/office/drawing/2014/main" id="{E8AA1B1E-34FA-47FF-AF26-005A9936A7B2}"/>
+                <a16:creationId xmlns:a16="http://schemas.microsoft.com/office/drawing/2014/main" id="{3200C5F3-97C1-4F08-839B-FF2A0DB95FE0}"/>
               </a:ext>
             </a:extLst>
           </p:cNvPr>
@@ -7131,48 +7376,28 @@
           <a:bodyPr/>
           <a:lstStyle/>
           <a:p>
-            <a:pPr marL="0" indent="0">
-              <a:buNone/>
-            </a:pPr>
             <a:r>
               <a:rPr lang="en-US" dirty="0"/>
-              <a:t>What did I complete?</a:t>
+              <a:t>AS A USER, I want to be able to add a car to the system. SO I CAN start recording the modifications.</a:t>
             </a:r>
           </a:p>
           <a:p>
             <a:r>
               <a:rPr lang="en-US" dirty="0"/>
-              <a:t>Was able to complete all issues in each sprint.</a:t>
+              <a:t>AS A USER, I want to be able to add a modification to a car. SO I CAN keep track of the modification.</a:t>
             </a:r>
           </a:p>
           <a:p>
             <a:r>
               <a:rPr lang="en-US" dirty="0"/>
-              <a:t>End of every sprint code was tested.</a:t>
+              <a:t>AS A USER, I want to be able to read all modifications on a car. SO I CAN see all the modifications on the car.</a:t>
             </a:r>
           </a:p>
           <a:p>
             <a:r>
               <a:rPr lang="en-US" dirty="0"/>
-              <a:t>Next sprint would include bugs/tasks from previous sprint.</a:t>
-            </a:r>
-          </a:p>
-          <a:p>
-            <a:pPr marL="0" indent="0">
-              <a:buNone/>
-            </a:pPr>
-            <a:r>
-              <a:rPr lang="en-US" dirty="0"/>
-              <a:t>What got left behind?</a:t>
-            </a:r>
-          </a:p>
-          <a:p>
-            <a:pPr marL="0" indent="0">
-              <a:buNone/>
-            </a:pPr>
-            <a:endParaRPr lang="en-US" dirty="0"/>
-          </a:p>
-          <a:p>
+              <a:t>AS A USER, I want to see how much I've spent on modifications.</a:t>
+            </a:r>
             <a:endParaRPr lang="en-GB" dirty="0"/>
           </a:p>
         </p:txBody>
@@ -7180,7 +7405,7 @@
     </p:spTree>
     <p:extLst>
       <p:ext uri="{BB962C8B-B14F-4D97-AF65-F5344CB8AC3E}">
-        <p14:creationId xmlns:p14="http://schemas.microsoft.com/office/powerpoint/2010/main" val="476931678"/>
+        <p14:creationId xmlns:p14="http://schemas.microsoft.com/office/powerpoint/2010/main" val="2340439451"/>
       </p:ext>
     </p:extLst>
   </p:cSld>
@@ -7212,7 +7437,7 @@
           <p:cNvPr id="2" name="Title 1">
             <a:extLst>
               <a:ext uri="{FF2B5EF4-FFF2-40B4-BE49-F238E27FC236}">
-                <a16:creationId xmlns:a16="http://schemas.microsoft.com/office/drawing/2014/main" id="{6CAC08FC-6E29-44AD-88A4-8465E2562C1F}"/>
+                <a16:creationId xmlns:a16="http://schemas.microsoft.com/office/drawing/2014/main" id="{83026605-4CDC-49E7-8D2D-5A2B709B4BBC}"/>
               </a:ext>
             </a:extLst>
           </p:cNvPr>
@@ -7229,19 +7454,11 @@
           <a:lstStyle/>
           <a:p>
             <a:r>
-              <a:rPr lang="en-US" dirty="0">
-                <a:solidFill>
-                  <a:schemeClr val="tx1"/>
-                </a:solidFill>
-              </a:rPr>
-              <a:t>Sprint Retrospective</a:t>
+              <a:rPr lang="en-US" dirty="0"/>
+              <a:t>Sprint Review</a:t>
             </a:r>
             <a:br>
-              <a:rPr lang="en-US" dirty="0">
-                <a:solidFill>
-                  <a:schemeClr val="tx1"/>
-                </a:solidFill>
-              </a:rPr>
+              <a:rPr lang="en-US" dirty="0"/>
             </a:br>
             <a:r>
               <a:rPr lang="en-GB" sz="1800" dirty="0">
@@ -7253,7 +7470,7 @@
                 <a:ea typeface="Calibri" panose="020F0502020204030204" pitchFamily="34" charset="0"/>
                 <a:cs typeface="Segoe UI" panose="020B0502040204020203" pitchFamily="34" charset="0"/>
               </a:rPr>
-              <a:t>What went well? What could be improved?</a:t>
+              <a:t>What did I complete? What got left behind?</a:t>
             </a:r>
             <a:endParaRPr lang="en-GB" dirty="0">
               <a:solidFill>
@@ -7268,7 +7485,7 @@
           <p:cNvPr id="3" name="Content Placeholder 2">
             <a:extLst>
               <a:ext uri="{FF2B5EF4-FFF2-40B4-BE49-F238E27FC236}">
-                <a16:creationId xmlns:a16="http://schemas.microsoft.com/office/drawing/2014/main" id="{603FE918-150C-477F-8089-DD313039964D}"/>
+                <a16:creationId xmlns:a16="http://schemas.microsoft.com/office/drawing/2014/main" id="{E8AA1B1E-34FA-47FF-AF26-005A9936A7B2}"/>
               </a:ext>
             </a:extLst>
           </p:cNvPr>
@@ -7288,29 +7505,26 @@
               <a:buNone/>
             </a:pPr>
             <a:r>
-              <a:rPr lang="en-GB" sz="2000" dirty="0">
-                <a:solidFill>
-                  <a:schemeClr val="tx1"/>
-                </a:solidFill>
-                <a:effectLst/>
-                <a:latin typeface="Montserrat Light"/>
-                <a:ea typeface="Calibri" panose="020F0502020204030204" pitchFamily="34" charset="0"/>
-                <a:cs typeface="Segoe UI" panose="020B0502040204020203" pitchFamily="34" charset="0"/>
-              </a:rPr>
-              <a:t>What went well?</a:t>
-            </a:r>
-            <a:endParaRPr lang="en-US" dirty="0"/>
-          </a:p>
-          <a:p>
-            <a:r>
               <a:rPr lang="en-US" dirty="0"/>
-              <a:t>Was able to complete all issues set.</a:t>
+              <a:t>What did I complete?</a:t>
             </a:r>
           </a:p>
           <a:p>
             <a:r>
               <a:rPr lang="en-US" dirty="0"/>
-              <a:t>Tested the code and updated the issues before every sprint.</a:t>
+              <a:t>Was able to complete all issues in each sprint.</a:t>
+            </a:r>
+          </a:p>
+          <a:p>
+            <a:r>
+              <a:rPr lang="en-US" dirty="0"/>
+              <a:t>End of every sprint code was tested.</a:t>
+            </a:r>
+          </a:p>
+          <a:p>
+            <a:r>
+              <a:rPr lang="en-US" dirty="0"/>
+              <a:t>Next sprint would include bugs/tasks from previous sprint.</a:t>
             </a:r>
           </a:p>
           <a:p>
@@ -7318,42 +7532,31 @@
               <a:buNone/>
             </a:pPr>
             <a:r>
-              <a:rPr lang="en-GB" sz="2000" dirty="0">
-                <a:solidFill>
-                  <a:schemeClr val="tx1"/>
-                </a:solidFill>
-                <a:effectLst/>
-                <a:latin typeface="Montserrat Light"/>
-                <a:ea typeface="Calibri" panose="020F0502020204030204" pitchFamily="34" charset="0"/>
-                <a:cs typeface="Segoe UI" panose="020B0502040204020203" pitchFamily="34" charset="0"/>
-              </a:rPr>
-              <a:t>What could be improved?</a:t>
-            </a:r>
-          </a:p>
-          <a:p>
-            <a:r>
-              <a:rPr lang="en-GB" dirty="0"/>
-              <a:t>Not go over the set days for the sprints. Set realistic timeframes.</a:t>
-            </a:r>
-          </a:p>
-          <a:p>
-            <a:r>
-              <a:rPr lang="en-GB" dirty="0"/>
-              <a:t>More realistic story points for the issues. Usually overestimating.</a:t>
-            </a:r>
-          </a:p>
-          <a:p>
-            <a:r>
-              <a:rPr lang="en-GB" dirty="0"/>
-              <a:t>More practice with JS would have made coding a lot easier for the frontend.</a:t>
-            </a:r>
+              <a:rPr lang="en-US" dirty="0"/>
+              <a:t>What got left behind?</a:t>
+            </a:r>
+          </a:p>
+          <a:p>
+            <a:r>
+              <a:rPr lang="en-US" dirty="0"/>
+              <a:t>Task/user story moved to next sprint.</a:t>
+            </a:r>
+          </a:p>
+          <a:p>
+            <a:r>
+              <a:rPr lang="en-US" dirty="0"/>
+              <a:t>All tasks and user stories set were completed.</a:t>
+            </a:r>
+          </a:p>
+          <a:p>
+            <a:endParaRPr lang="en-GB" dirty="0"/>
           </a:p>
         </p:txBody>
       </p:sp>
     </p:spTree>
     <p:extLst>
       <p:ext uri="{BB962C8B-B14F-4D97-AF65-F5344CB8AC3E}">
-        <p14:creationId xmlns:p14="http://schemas.microsoft.com/office/powerpoint/2010/main" val="1905374204"/>
+        <p14:creationId xmlns:p14="http://schemas.microsoft.com/office/powerpoint/2010/main" val="476931678"/>
       </p:ext>
     </p:extLst>
   </p:cSld>
@@ -7385,7 +7588,7 @@
           <p:cNvPr id="2" name="Title 1">
             <a:extLst>
               <a:ext uri="{FF2B5EF4-FFF2-40B4-BE49-F238E27FC236}">
-                <a16:creationId xmlns:a16="http://schemas.microsoft.com/office/drawing/2014/main" id="{8CC9A52B-6B1F-47CF-82B3-7A2C3B2E493B}"/>
+                <a16:creationId xmlns:a16="http://schemas.microsoft.com/office/drawing/2014/main" id="{6CAC08FC-6E29-44AD-88A4-8465E2562C1F}"/>
               </a:ext>
             </a:extLst>
           </p:cNvPr>
@@ -7407,7 +7610,7 @@
                   <a:schemeClr val="tx1"/>
                 </a:solidFill>
               </a:rPr>
-              <a:t>Conclusion</a:t>
+              <a:t>Sprint Retrospective</a:t>
             </a:r>
             <a:br>
               <a:rPr lang="en-US" dirty="0">
@@ -7426,7 +7629,7 @@
                 <a:ea typeface="Calibri" panose="020F0502020204030204" pitchFamily="34" charset="0"/>
                 <a:cs typeface="Segoe UI" panose="020B0502040204020203" pitchFamily="34" charset="0"/>
               </a:rPr>
-              <a:t>Reflections on the project, future steps.</a:t>
+              <a:t>What went well? What could be improved?</a:t>
             </a:r>
             <a:endParaRPr lang="en-GB" dirty="0">
               <a:solidFill>
@@ -7441,7 +7644,7 @@
           <p:cNvPr id="3" name="Content Placeholder 2">
             <a:extLst>
               <a:ext uri="{FF2B5EF4-FFF2-40B4-BE49-F238E27FC236}">
-                <a16:creationId xmlns:a16="http://schemas.microsoft.com/office/drawing/2014/main" id="{E7CEB03A-F562-4236-ACA9-CA5C1D26986E}"/>
+                <a16:creationId xmlns:a16="http://schemas.microsoft.com/office/drawing/2014/main" id="{603FE918-150C-477F-8089-DD313039964D}"/>
               </a:ext>
             </a:extLst>
           </p:cNvPr>
@@ -7457,67 +7660,68 @@
           <a:bodyPr/>
           <a:lstStyle/>
           <a:p>
+            <a:pPr marL="0" indent="0">
+              <a:buNone/>
+            </a:pPr>
+            <a:r>
+              <a:rPr lang="en-GB" sz="2000" dirty="0">
+                <a:solidFill>
+                  <a:schemeClr val="tx1"/>
+                </a:solidFill>
+                <a:effectLst/>
+                <a:latin typeface="Montserrat Light"/>
+                <a:ea typeface="Calibri" panose="020F0502020204030204" pitchFamily="34" charset="0"/>
+                <a:cs typeface="Segoe UI" panose="020B0502040204020203" pitchFamily="34" charset="0"/>
+              </a:rPr>
+              <a:t>What went well?</a:t>
+            </a:r>
+            <a:endParaRPr lang="en-US" dirty="0"/>
+          </a:p>
+          <a:p>
             <a:r>
               <a:rPr lang="en-US" dirty="0"/>
-              <a:t>Project helped me gain confidence in Spring Boot and </a:t>
-            </a:r>
-            <a:r>
-              <a:rPr lang="en-US" dirty="0" err="1"/>
-              <a:t>HTMl</a:t>
-            </a:r>
+              <a:t>Was able to complete all issues set.</a:t>
+            </a:r>
+          </a:p>
+          <a:p>
             <a:r>
               <a:rPr lang="en-US" dirty="0"/>
-              <a:t>/CSS/JS</a:t>
-            </a:r>
-          </a:p>
-          <a:p>
-            <a:r>
-              <a:rPr lang="en-US" dirty="0"/>
-              <a:t>Learned usefulness of JS in creating elements.</a:t>
-            </a:r>
-          </a:p>
-          <a:p>
-            <a:r>
-              <a:rPr lang="en-US" dirty="0"/>
-              <a:t>Learned how to do frontend testing with Selenium.</a:t>
-            </a:r>
-          </a:p>
-          <a:p>
-            <a:endParaRPr lang="en-US" dirty="0"/>
-          </a:p>
-          <a:p>
-            <a:r>
-              <a:rPr lang="en-US" dirty="0"/>
-              <a:t>Future work</a:t>
-            </a:r>
-          </a:p>
-          <a:p>
-            <a:pPr lvl="1"/>
-            <a:r>
-              <a:rPr lang="en-US" dirty="0"/>
-              <a:t>Redesign UI, more responsive etc..</a:t>
-            </a:r>
-          </a:p>
-          <a:p>
-            <a:pPr lvl="1"/>
-            <a:r>
-              <a:rPr lang="en-US" dirty="0"/>
-              <a:t>Add option to add service items</a:t>
-            </a:r>
-          </a:p>
-          <a:p>
-            <a:pPr lvl="1"/>
-            <a:r>
-              <a:rPr lang="en-US" dirty="0"/>
-              <a:t>Add options to notify of next MOT, Tax </a:t>
-            </a:r>
-            <a:r>
-              <a:rPr lang="en-US" dirty="0" err="1"/>
-              <a:t>etc</a:t>
-            </a:r>
-            <a:r>
-              <a:rPr lang="en-US" dirty="0"/>
-              <a:t>…</a:t>
+              <a:t>Tested the code and updated the issues before every sprint.</a:t>
+            </a:r>
+          </a:p>
+          <a:p>
+            <a:pPr marL="0" indent="0">
+              <a:buNone/>
+            </a:pPr>
+            <a:r>
+              <a:rPr lang="en-GB" sz="2000" dirty="0">
+                <a:solidFill>
+                  <a:schemeClr val="tx1"/>
+                </a:solidFill>
+                <a:effectLst/>
+                <a:latin typeface="Montserrat Light"/>
+                <a:ea typeface="Calibri" panose="020F0502020204030204" pitchFamily="34" charset="0"/>
+                <a:cs typeface="Segoe UI" panose="020B0502040204020203" pitchFamily="34" charset="0"/>
+              </a:rPr>
+              <a:t>What could be improved?</a:t>
+            </a:r>
+          </a:p>
+          <a:p>
+            <a:r>
+              <a:rPr lang="en-GB" dirty="0"/>
+              <a:t>Not go over the set days for the sprints. Set realistic timeframes.</a:t>
+            </a:r>
+          </a:p>
+          <a:p>
+            <a:r>
+              <a:rPr lang="en-GB" dirty="0"/>
+              <a:t>More realistic story points for the issues. Usually overestimating SP.</a:t>
+            </a:r>
+          </a:p>
+          <a:p>
+            <a:r>
+              <a:rPr lang="en-GB" dirty="0"/>
+              <a:t>More practice with JS would have made coding a lot easier for the frontend.</a:t>
             </a:r>
           </a:p>
         </p:txBody>
@@ -7525,7 +7729,7 @@
     </p:spTree>
     <p:extLst>
       <p:ext uri="{BB962C8B-B14F-4D97-AF65-F5344CB8AC3E}">
-        <p14:creationId xmlns:p14="http://schemas.microsoft.com/office/powerpoint/2010/main" val="3107617867"/>
+        <p14:creationId xmlns:p14="http://schemas.microsoft.com/office/powerpoint/2010/main" val="1905374204"/>
       </p:ext>
     </p:extLst>
   </p:cSld>

</xml_diff>

<commit_message>
Edited presentation and added PDF.
</commit_message>
<xml_diff>
--- a/Documentation/HWA Project.pptx
+++ b/Documentation/HWA Project.pptx
@@ -308,7 +308,7 @@
           <a:p>
             <a:fld id="{1DAE319A-9023-44E9-8348-8BBF1A41BE81}" type="datetimeFigureOut">
               <a:rPr lang="en-GB" smtClean="0"/>
-              <a:t>20/06/2021</a:t>
+              <a:t>21/06/2021</a:t>
             </a:fld>
             <a:endParaRPr lang="en-GB"/>
           </a:p>
@@ -583,7 +583,7 @@
           <a:p>
             <a:fld id="{1DAE319A-9023-44E9-8348-8BBF1A41BE81}" type="datetimeFigureOut">
               <a:rPr lang="en-GB" smtClean="0"/>
-              <a:t>20/06/2021</a:t>
+              <a:t>21/06/2021</a:t>
             </a:fld>
             <a:endParaRPr lang="en-GB"/>
           </a:p>
@@ -777,7 +777,7 @@
           <a:p>
             <a:fld id="{1DAE319A-9023-44E9-8348-8BBF1A41BE81}" type="datetimeFigureOut">
               <a:rPr lang="en-GB" smtClean="0"/>
-              <a:t>20/06/2021</a:t>
+              <a:t>21/06/2021</a:t>
             </a:fld>
             <a:endParaRPr lang="en-GB"/>
           </a:p>
@@ -1048,7 +1048,7 @@
           <a:p>
             <a:fld id="{1DAE319A-9023-44E9-8348-8BBF1A41BE81}" type="datetimeFigureOut">
               <a:rPr lang="en-GB" smtClean="0"/>
-              <a:t>20/06/2021</a:t>
+              <a:t>21/06/2021</a:t>
             </a:fld>
             <a:endParaRPr lang="en-GB"/>
           </a:p>
@@ -1375,7 +1375,7 @@
           <a:p>
             <a:fld id="{1DAE319A-9023-44E9-8348-8BBF1A41BE81}" type="datetimeFigureOut">
               <a:rPr lang="en-GB" smtClean="0"/>
-              <a:t>20/06/2021</a:t>
+              <a:t>21/06/2021</a:t>
             </a:fld>
             <a:endParaRPr lang="en-GB"/>
           </a:p>
@@ -1994,7 +1994,7 @@
           <a:p>
             <a:fld id="{1DAE319A-9023-44E9-8348-8BBF1A41BE81}" type="datetimeFigureOut">
               <a:rPr lang="en-GB" smtClean="0"/>
-              <a:t>20/06/2021</a:t>
+              <a:t>21/06/2021</a:t>
             </a:fld>
             <a:endParaRPr lang="en-GB"/>
           </a:p>
@@ -2841,7 +2841,7 @@
           <a:p>
             <a:fld id="{1DAE319A-9023-44E9-8348-8BBF1A41BE81}" type="datetimeFigureOut">
               <a:rPr lang="en-GB" smtClean="0"/>
-              <a:t>20/06/2021</a:t>
+              <a:t>21/06/2021</a:t>
             </a:fld>
             <a:endParaRPr lang="en-GB"/>
           </a:p>
@@ -3011,7 +3011,7 @@
           <a:p>
             <a:fld id="{1DAE319A-9023-44E9-8348-8BBF1A41BE81}" type="datetimeFigureOut">
               <a:rPr lang="en-GB" smtClean="0"/>
-              <a:t>20/06/2021</a:t>
+              <a:t>21/06/2021</a:t>
             </a:fld>
             <a:endParaRPr lang="en-GB"/>
           </a:p>
@@ -3191,7 +3191,7 @@
           <a:p>
             <a:fld id="{1DAE319A-9023-44E9-8348-8BBF1A41BE81}" type="datetimeFigureOut">
               <a:rPr lang="en-GB" smtClean="0"/>
-              <a:t>20/06/2021</a:t>
+              <a:t>21/06/2021</a:t>
             </a:fld>
             <a:endParaRPr lang="en-GB"/>
           </a:p>
@@ -3361,7 +3361,7 @@
           <a:p>
             <a:fld id="{1DAE319A-9023-44E9-8348-8BBF1A41BE81}" type="datetimeFigureOut">
               <a:rPr lang="en-GB" smtClean="0"/>
-              <a:t>20/06/2021</a:t>
+              <a:t>21/06/2021</a:t>
             </a:fld>
             <a:endParaRPr lang="en-GB"/>
           </a:p>
@@ -3608,7 +3608,7 @@
           <a:p>
             <a:fld id="{1DAE319A-9023-44E9-8348-8BBF1A41BE81}" type="datetimeFigureOut">
               <a:rPr lang="en-GB" smtClean="0"/>
-              <a:t>20/06/2021</a:t>
+              <a:t>21/06/2021</a:t>
             </a:fld>
             <a:endParaRPr lang="en-GB"/>
           </a:p>
@@ -3900,7 +3900,7 @@
           <a:p>
             <a:fld id="{1DAE319A-9023-44E9-8348-8BBF1A41BE81}" type="datetimeFigureOut">
               <a:rPr lang="en-GB" smtClean="0"/>
-              <a:t>20/06/2021</a:t>
+              <a:t>21/06/2021</a:t>
             </a:fld>
             <a:endParaRPr lang="en-GB"/>
           </a:p>
@@ -4344,7 +4344,7 @@
           <a:p>
             <a:fld id="{1DAE319A-9023-44E9-8348-8BBF1A41BE81}" type="datetimeFigureOut">
               <a:rPr lang="en-GB" smtClean="0"/>
-              <a:t>20/06/2021</a:t>
+              <a:t>21/06/2021</a:t>
             </a:fld>
             <a:endParaRPr lang="en-GB"/>
           </a:p>
@@ -4462,7 +4462,7 @@
           <a:p>
             <a:fld id="{1DAE319A-9023-44E9-8348-8BBF1A41BE81}" type="datetimeFigureOut">
               <a:rPr lang="en-GB" smtClean="0"/>
-              <a:t>20/06/2021</a:t>
+              <a:t>21/06/2021</a:t>
             </a:fld>
             <a:endParaRPr lang="en-GB"/>
           </a:p>
@@ -4557,7 +4557,7 @@
           <a:p>
             <a:fld id="{1DAE319A-9023-44E9-8348-8BBF1A41BE81}" type="datetimeFigureOut">
               <a:rPr lang="en-GB" smtClean="0"/>
-              <a:t>20/06/2021</a:t>
+              <a:t>21/06/2021</a:t>
             </a:fld>
             <a:endParaRPr lang="en-GB"/>
           </a:p>
@@ -4836,7 +4836,7 @@
           <a:p>
             <a:fld id="{1DAE319A-9023-44E9-8348-8BBF1A41BE81}" type="datetimeFigureOut">
               <a:rPr lang="en-GB" smtClean="0"/>
-              <a:t>20/06/2021</a:t>
+              <a:t>21/06/2021</a:t>
             </a:fld>
             <a:endParaRPr lang="en-GB"/>
           </a:p>
@@ -5111,7 +5111,7 @@
           <a:p>
             <a:fld id="{1DAE319A-9023-44E9-8348-8BBF1A41BE81}" type="datetimeFigureOut">
               <a:rPr lang="en-GB" smtClean="0"/>
-              <a:t>20/06/2021</a:t>
+              <a:t>21/06/2021</a:t>
             </a:fld>
             <a:endParaRPr lang="en-GB"/>
           </a:p>
@@ -5534,7 +5534,7 @@
           <a:p>
             <a:fld id="{1DAE319A-9023-44E9-8348-8BBF1A41BE81}" type="datetimeFigureOut">
               <a:rPr lang="en-GB" smtClean="0"/>
-              <a:t>20/06/2021</a:t>
+              <a:t>21/06/2021</a:t>
             </a:fld>
             <a:endParaRPr lang="en-GB"/>
           </a:p>
@@ -6236,7 +6236,9 @@
         </p:nvSpPr>
         <p:spPr/>
         <p:txBody>
-          <a:bodyPr/>
+          <a:bodyPr>
+            <a:normAutofit lnSpcReduction="10000"/>
+          </a:bodyPr>
           <a:lstStyle/>
           <a:p>
             <a:r>
@@ -6276,7 +6278,7 @@
             <a:pPr lvl="1"/>
             <a:r>
               <a:rPr lang="en-US" dirty="0"/>
-              <a:t>Add option to add service items</a:t>
+              <a:t>Add option to add service items.</a:t>
             </a:r>
           </a:p>
           <a:p>
@@ -6299,6 +6301,13 @@
             <a:r>
               <a:rPr lang="en-US" dirty="0"/>
               <a:t>Automatically enter current details in to fields when selecting car to update.</a:t>
+            </a:r>
+          </a:p>
+          <a:p>
+            <a:pPr lvl="1"/>
+            <a:r>
+              <a:rPr lang="en-US" dirty="0"/>
+              <a:t>Change default picture.</a:t>
             </a:r>
           </a:p>
         </p:txBody>
@@ -7249,7 +7258,7 @@
           <a:p>
             <a:r>
               <a:rPr lang="en-US" dirty="0"/>
-              <a:t>Efficient coding.</a:t>
+              <a:t>Efficient coding practices.</a:t>
             </a:r>
           </a:p>
           <a:p>

</xml_diff>